<commit_message>
Alterações finais com pdf
</commit_message>
<xml_diff>
--- a/Cronograma/Apresentacao.pptx
+++ b/Cronograma/Apresentacao.pptx
@@ -117,6 +117,11 @@
       </a:defRPr>
     </a:lvl9pPr>
   </p:defaultTextStyle>
+  <p:extLst>
+    <p:ext uri="{EFAFB233-063F-42B5-8137-9DF3F51BA10A}">
+      <p15:sldGuideLst xmlns:p15="http://schemas.microsoft.com/office/powerpoint/2012/main"/>
+    </p:ext>
+  </p:extLst>
 </p:presentation>
 </file>
 
@@ -3061,15 +3066,19 @@
             </a:r>
             <a:r>
               <a:rPr lang="pt-BR" sz="2000" dirty="0" smtClean="0"/>
-              <a:t> Gomes Júnior,</a:t>
+              <a:t> </a:t>
+            </a:r>
+            <a:r>
+              <a:rPr lang="pt-BR" sz="2000" smtClean="0"/>
+              <a:t>Gomes </a:t>
+            </a:r>
+            <a:r>
+              <a:rPr lang="pt-BR" sz="2000" smtClean="0"/>
+              <a:t>Junior</a:t>
             </a:r>
             <a:r>
               <a:rPr lang="pt-BR" sz="2000" dirty="0" smtClean="0"/>
-              <a:t> </a:t>
-            </a:r>
-            <a:r>
-              <a:rPr lang="pt-BR" sz="2000" dirty="0" smtClean="0"/>
-              <a:t>Lucas Carvalho Ribeiro, Pedro Henrique Gasparetto Lugão</a:t>
+              <a:t>, Lucas Carvalho Ribeiro, Pedro Henrique Gasparetto Lugão</a:t>
             </a:r>
           </a:p>
           <a:p>
@@ -3594,7 +3603,9 @@
         </p:nvSpPr>
         <p:spPr/>
         <p:txBody>
-          <a:bodyPr/>
+          <a:bodyPr>
+            <a:normAutofit fontScale="85000" lnSpcReduction="10000"/>
+          </a:bodyPr>
           <a:lstStyle/>
           <a:p>
             <a:r>
@@ -3630,7 +3641,41 @@
           <a:p>
             <a:r>
               <a:rPr lang="pt-BR" dirty="0" smtClean="0"/>
-              <a:t>Para o desenvolvimento escolhemos seguir o modelo espiral, que faz uso da prototipação incremental</a:t>
+              <a:t>Para o desenvolvimento escolhemos seguir o modelo espiral, que faz uso da prototipação </a:t>
+            </a:r>
+            <a:r>
+              <a:rPr lang="pt-BR" dirty="0" smtClean="0"/>
+              <a:t>incremental</a:t>
+            </a:r>
+          </a:p>
+          <a:p>
+            <a:r>
+              <a:rPr lang="pt-BR" dirty="0" smtClean="0"/>
+              <a:t>Durante o processo, utilizaremos a ferramenta Unity3D para o desenvolvimento, </a:t>
+            </a:r>
+            <a:r>
+              <a:rPr lang="pt-BR" dirty="0" err="1" smtClean="0"/>
+              <a:t>Pencil</a:t>
+            </a:r>
+            <a:r>
+              <a:rPr lang="pt-BR" dirty="0" smtClean="0"/>
+              <a:t> para o eventuais desenhos de interfaces, </a:t>
+            </a:r>
+            <a:r>
+              <a:rPr lang="pt-BR" dirty="0" err="1" smtClean="0"/>
+              <a:t>StarUML</a:t>
+            </a:r>
+            <a:r>
+              <a:rPr lang="pt-BR" dirty="0" smtClean="0"/>
+              <a:t> para o desenvolvimento de diagramas UML e </a:t>
+            </a:r>
+            <a:r>
+              <a:rPr lang="pt-BR" dirty="0" err="1" smtClean="0"/>
+              <a:t>GitHub</a:t>
+            </a:r>
+            <a:r>
+              <a:rPr lang="pt-BR" dirty="0" smtClean="0"/>
+              <a:t> para o controle de versão. Para demais tarefas os recursos serão definidos nas fases de análise de viabilidade, assim como os membros do grupo responsáveis por cada tarefa</a:t>
             </a:r>
             <a:endParaRPr lang="pt-BR" dirty="0"/>
           </a:p>

</xml_diff>